<commit_message>
finalizacao do prototipo e pinos
prototipo terminado e tds os pinos debugados
</commit_message>
<xml_diff>
--- a/Docs/tela/conexao shild tela.pptx
+++ b/Docs/tela/conexao shild tela.pptx
@@ -259,7 +259,7 @@
           <a:p>
             <a:fld id="{19B671A8-A013-4C85-95AD-EE59B459D0E1}" type="datetimeFigureOut">
               <a:rPr lang="pt-BR" smtClean="0"/>
-              <a:t>08/03/2018</a:t>
+              <a:t>15/03/2018</a:t>
             </a:fld>
             <a:endParaRPr lang="pt-BR"/>
           </a:p>
@@ -457,7 +457,7 @@
           <a:p>
             <a:fld id="{19B671A8-A013-4C85-95AD-EE59B459D0E1}" type="datetimeFigureOut">
               <a:rPr lang="pt-BR" smtClean="0"/>
-              <a:t>08/03/2018</a:t>
+              <a:t>15/03/2018</a:t>
             </a:fld>
             <a:endParaRPr lang="pt-BR"/>
           </a:p>
@@ -665,7 +665,7 @@
           <a:p>
             <a:fld id="{19B671A8-A013-4C85-95AD-EE59B459D0E1}" type="datetimeFigureOut">
               <a:rPr lang="pt-BR" smtClean="0"/>
-              <a:t>08/03/2018</a:t>
+              <a:t>15/03/2018</a:t>
             </a:fld>
             <a:endParaRPr lang="pt-BR"/>
           </a:p>
@@ -863,7 +863,7 @@
           <a:p>
             <a:fld id="{19B671A8-A013-4C85-95AD-EE59B459D0E1}" type="datetimeFigureOut">
               <a:rPr lang="pt-BR" smtClean="0"/>
-              <a:t>08/03/2018</a:t>
+              <a:t>15/03/2018</a:t>
             </a:fld>
             <a:endParaRPr lang="pt-BR"/>
           </a:p>
@@ -1138,7 +1138,7 @@
           <a:p>
             <a:fld id="{19B671A8-A013-4C85-95AD-EE59B459D0E1}" type="datetimeFigureOut">
               <a:rPr lang="pt-BR" smtClean="0"/>
-              <a:t>08/03/2018</a:t>
+              <a:t>15/03/2018</a:t>
             </a:fld>
             <a:endParaRPr lang="pt-BR"/>
           </a:p>
@@ -1403,7 +1403,7 @@
           <a:p>
             <a:fld id="{19B671A8-A013-4C85-95AD-EE59B459D0E1}" type="datetimeFigureOut">
               <a:rPr lang="pt-BR" smtClean="0"/>
-              <a:t>08/03/2018</a:t>
+              <a:t>15/03/2018</a:t>
             </a:fld>
             <a:endParaRPr lang="pt-BR"/>
           </a:p>
@@ -1815,7 +1815,7 @@
           <a:p>
             <a:fld id="{19B671A8-A013-4C85-95AD-EE59B459D0E1}" type="datetimeFigureOut">
               <a:rPr lang="pt-BR" smtClean="0"/>
-              <a:t>08/03/2018</a:t>
+              <a:t>15/03/2018</a:t>
             </a:fld>
             <a:endParaRPr lang="pt-BR"/>
           </a:p>
@@ -1956,7 +1956,7 @@
           <a:p>
             <a:fld id="{19B671A8-A013-4C85-95AD-EE59B459D0E1}" type="datetimeFigureOut">
               <a:rPr lang="pt-BR" smtClean="0"/>
-              <a:t>08/03/2018</a:t>
+              <a:t>15/03/2018</a:t>
             </a:fld>
             <a:endParaRPr lang="pt-BR"/>
           </a:p>
@@ -2069,7 +2069,7 @@
           <a:p>
             <a:fld id="{19B671A8-A013-4C85-95AD-EE59B459D0E1}" type="datetimeFigureOut">
               <a:rPr lang="pt-BR" smtClean="0"/>
-              <a:t>08/03/2018</a:t>
+              <a:t>15/03/2018</a:t>
             </a:fld>
             <a:endParaRPr lang="pt-BR"/>
           </a:p>
@@ -2380,7 +2380,7 @@
           <a:p>
             <a:fld id="{19B671A8-A013-4C85-95AD-EE59B459D0E1}" type="datetimeFigureOut">
               <a:rPr lang="pt-BR" smtClean="0"/>
-              <a:t>08/03/2018</a:t>
+              <a:t>15/03/2018</a:t>
             </a:fld>
             <a:endParaRPr lang="pt-BR"/>
           </a:p>
@@ -2668,7 +2668,7 @@
           <a:p>
             <a:fld id="{19B671A8-A013-4C85-95AD-EE59B459D0E1}" type="datetimeFigureOut">
               <a:rPr lang="pt-BR" smtClean="0"/>
-              <a:t>08/03/2018</a:t>
+              <a:t>15/03/2018</a:t>
             </a:fld>
             <a:endParaRPr lang="pt-BR"/>
           </a:p>
@@ -2909,7 +2909,7 @@
           <a:p>
             <a:fld id="{19B671A8-A013-4C85-95AD-EE59B459D0E1}" type="datetimeFigureOut">
               <a:rPr lang="pt-BR" smtClean="0"/>
-              <a:t>08/03/2018</a:t>
+              <a:t>15/03/2018</a:t>
             </a:fld>
             <a:endParaRPr lang="pt-BR"/>
           </a:p>
@@ -3803,12 +3803,95 @@
           </p:txBody>
         </p:sp>
       </p:grpSp>
+      <p:sp>
+        <p:nvSpPr>
+          <p:cNvPr id="2" name="CaixaDeTexto 1">
+            <a:extLst>
+              <a:ext uri="{FF2B5EF4-FFF2-40B4-BE49-F238E27FC236}">
+                <a16:creationId xmlns:a16="http://schemas.microsoft.com/office/drawing/2014/main" id="{1F5E33B8-7DD2-4CB4-8FEF-D381E225FDA9}"/>
+              </a:ext>
+            </a:extLst>
+          </p:cNvPr>
+          <p:cNvSpPr txBox="1"/>
+          <p:nvPr/>
+        </p:nvSpPr>
+        <p:spPr>
+          <a:xfrm>
+            <a:off x="6464754" y="1383790"/>
+            <a:ext cx="433132" cy="369332"/>
+          </a:xfrm>
+          <a:prstGeom prst="rect">
+            <a:avLst/>
+          </a:prstGeom>
+          <a:noFill/>
+        </p:spPr>
+        <p:txBody>
+          <a:bodyPr wrap="none" rtlCol="0">
+            <a:spAutoFit/>
+          </a:bodyPr>
+          <a:lstStyle/>
+          <a:p>
+            <a:r>
+              <a:rPr lang="pt-BR" dirty="0">
+                <a:solidFill>
+                  <a:srgbClr val="FFFF00"/>
+                </a:solidFill>
+              </a:rPr>
+              <a:t>5V</a:t>
+            </a:r>
+          </a:p>
+        </p:txBody>
+      </p:sp>
+      <p:sp>
+        <p:nvSpPr>
+          <p:cNvPr id="3" name="CaixaDeTexto 2">
+            <a:extLst>
+              <a:ext uri="{FF2B5EF4-FFF2-40B4-BE49-F238E27FC236}">
+                <a16:creationId xmlns:a16="http://schemas.microsoft.com/office/drawing/2014/main" id="{2E34CE24-170C-4529-8711-F1D3D163B155}"/>
+              </a:ext>
+            </a:extLst>
+          </p:cNvPr>
+          <p:cNvSpPr txBox="1"/>
+          <p:nvPr/>
+        </p:nvSpPr>
+        <p:spPr>
+          <a:xfrm>
+            <a:off x="6412656" y="1586927"/>
+            <a:ext cx="537327" cy="369332"/>
+          </a:xfrm>
+          <a:prstGeom prst="rect">
+            <a:avLst/>
+          </a:prstGeom>
+          <a:noFill/>
+        </p:spPr>
+        <p:txBody>
+          <a:bodyPr wrap="none" rtlCol="0">
+            <a:spAutoFit/>
+          </a:bodyPr>
+          <a:lstStyle/>
+          <a:p>
+            <a:r>
+              <a:rPr lang="pt-BR" dirty="0" err="1">
+                <a:solidFill>
+                  <a:srgbClr val="FFFF00"/>
+                </a:solidFill>
+              </a:rPr>
+              <a:t>gnd</a:t>
+            </a:r>
+            <a:endParaRPr lang="pt-BR" dirty="0">
+              <a:solidFill>
+                <a:srgbClr val="FFFF00"/>
+              </a:solidFill>
+            </a:endParaRPr>
+          </a:p>
+        </p:txBody>
+      </p:sp>
       <p:pic>
         <p:nvPicPr>
-          <p:cNvPr id="25" name="Imagem 24">
-            <a:extLst>
-              <a:ext uri="{FF2B5EF4-FFF2-40B4-BE49-F238E27FC236}">
-                <a16:creationId xmlns:a16="http://schemas.microsoft.com/office/drawing/2014/main" id="{F6927261-E5A4-4E7A-A84A-6E3850DD4E72}"/>
+          <p:cNvPr id="6" name="Imagem 5">
+            <a:extLst>
+              <a:ext uri="{FF2B5EF4-FFF2-40B4-BE49-F238E27FC236}">
+                <a16:creationId xmlns:a16="http://schemas.microsoft.com/office/drawing/2014/main" id="{D91F1F87-2D32-4887-B551-6E9195C49FE2}"/>
               </a:ext>
             </a:extLst>
           </p:cNvPr>
@@ -3825,8 +3908,8 @@
         </p:blipFill>
         <p:spPr>
           <a:xfrm rot="16200000">
-            <a:off x="5236707" y="2471966"/>
-            <a:ext cx="6501894" cy="1765587"/>
+            <a:off x="5805788" y="2617439"/>
+            <a:ext cx="5802167" cy="1474641"/>
           </a:xfrm>
           <a:prstGeom prst="rect">
             <a:avLst/>
@@ -3836,89 +3919,36 @@
           </a:solidFill>
         </p:spPr>
       </p:pic>
-      <p:sp>
-        <p:nvSpPr>
-          <p:cNvPr id="2" name="CaixaDeTexto 1">
-            <a:extLst>
-              <a:ext uri="{FF2B5EF4-FFF2-40B4-BE49-F238E27FC236}">
-                <a16:creationId xmlns:a16="http://schemas.microsoft.com/office/drawing/2014/main" id="{1F5E33B8-7DD2-4CB4-8FEF-D381E225FDA9}"/>
-              </a:ext>
-            </a:extLst>
-          </p:cNvPr>
-          <p:cNvSpPr txBox="1"/>
+      <p:pic>
+        <p:nvPicPr>
+          <p:cNvPr id="7" name="Imagem 6">
+            <a:extLst>
+              <a:ext uri="{FF2B5EF4-FFF2-40B4-BE49-F238E27FC236}">
+                <a16:creationId xmlns:a16="http://schemas.microsoft.com/office/drawing/2014/main" id="{20AE5508-4DA5-4BCF-9590-288B4E96C521}"/>
+              </a:ext>
+            </a:extLst>
+          </p:cNvPr>
+          <p:cNvPicPr>
+            <a:picLocks noChangeAspect="1"/>
+          </p:cNvPicPr>
           <p:nvPr/>
-        </p:nvSpPr>
+        </p:nvPicPr>
+        <p:blipFill>
+          <a:blip r:embed="rId5"/>
+          <a:stretch>
+            <a:fillRect/>
+          </a:stretch>
+        </p:blipFill>
         <p:spPr>
-          <a:xfrm>
-            <a:off x="6464754" y="1383790"/>
-            <a:ext cx="433132" cy="369332"/>
+          <a:xfrm rot="16200000">
+            <a:off x="896828" y="2392635"/>
+            <a:ext cx="1354643" cy="692046"/>
           </a:xfrm>
           <a:prstGeom prst="rect">
             <a:avLst/>
           </a:prstGeom>
-          <a:noFill/>
         </p:spPr>
-        <p:txBody>
-          <a:bodyPr wrap="none" rtlCol="0">
-            <a:spAutoFit/>
-          </a:bodyPr>
-          <a:lstStyle/>
-          <a:p>
-            <a:r>
-              <a:rPr lang="pt-BR" dirty="0">
-                <a:solidFill>
-                  <a:srgbClr val="FFFF00"/>
-                </a:solidFill>
-              </a:rPr>
-              <a:t>5V</a:t>
-            </a:r>
-          </a:p>
-        </p:txBody>
-      </p:sp>
-      <p:sp>
-        <p:nvSpPr>
-          <p:cNvPr id="3" name="CaixaDeTexto 2">
-            <a:extLst>
-              <a:ext uri="{FF2B5EF4-FFF2-40B4-BE49-F238E27FC236}">
-                <a16:creationId xmlns:a16="http://schemas.microsoft.com/office/drawing/2014/main" id="{2E34CE24-170C-4529-8711-F1D3D163B155}"/>
-              </a:ext>
-            </a:extLst>
-          </p:cNvPr>
-          <p:cNvSpPr txBox="1"/>
-          <p:nvPr/>
-        </p:nvSpPr>
-        <p:spPr>
-          <a:xfrm>
-            <a:off x="6412656" y="1586927"/>
-            <a:ext cx="537327" cy="369332"/>
-          </a:xfrm>
-          <a:prstGeom prst="rect">
-            <a:avLst/>
-          </a:prstGeom>
-          <a:noFill/>
-        </p:spPr>
-        <p:txBody>
-          <a:bodyPr wrap="none" rtlCol="0">
-            <a:spAutoFit/>
-          </a:bodyPr>
-          <a:lstStyle/>
-          <a:p>
-            <a:r>
-              <a:rPr lang="pt-BR" dirty="0" err="1">
-                <a:solidFill>
-                  <a:srgbClr val="FFFF00"/>
-                </a:solidFill>
-              </a:rPr>
-              <a:t>gnd</a:t>
-            </a:r>
-            <a:endParaRPr lang="pt-BR" dirty="0">
-              <a:solidFill>
-                <a:srgbClr val="FFFF00"/>
-              </a:solidFill>
-            </a:endParaRPr>
-          </a:p>
-        </p:txBody>
-      </p:sp>
+      </p:pic>
     </p:spTree>
     <p:extLst>
       <p:ext uri="{BB962C8B-B14F-4D97-AF65-F5344CB8AC3E}">

</xml_diff>